<commit_message>
PROTOTYPE - watchdog added
</commit_message>
<xml_diff>
--- a/test/3.pptx
+++ b/test/3.pptx
@@ -199,7 +199,7 @@
           <a:p>
             <a:fld id="{48B2CECA-E59B-4BB2-B271-ADCC1AA57FDC}" type="datetimeFigureOut">
               <a:rPr lang="en-NZ" smtClean="0"/>
-              <a:t>17/08/2024</a:t>
+              <a:t>18/08/2024</a:t>
             </a:fld>
             <a:endParaRPr lang="en-NZ"/>
           </a:p>
@@ -650,7 +650,7 @@
           <a:p>
             <a:fld id="{33EE26BC-D039-4438-8DF1-E4431934D20B}" type="datetimeFigureOut">
               <a:rPr lang="en-NZ" smtClean="0"/>
-              <a:t>17/08/2024</a:t>
+              <a:t>18/08/2024</a:t>
             </a:fld>
             <a:endParaRPr lang="en-NZ"/>
           </a:p>
@@ -925,7 +925,7 @@
           <a:p>
             <a:fld id="{33EE26BC-D039-4438-8DF1-E4431934D20B}" type="datetimeFigureOut">
               <a:rPr lang="en-NZ" smtClean="0"/>
-              <a:t>17/08/2024</a:t>
+              <a:t>18/08/2024</a:t>
             </a:fld>
             <a:endParaRPr lang="en-NZ"/>
           </a:p>
@@ -1119,7 +1119,7 @@
           <a:p>
             <a:fld id="{33EE26BC-D039-4438-8DF1-E4431934D20B}" type="datetimeFigureOut">
               <a:rPr lang="en-NZ" smtClean="0"/>
-              <a:t>17/08/2024</a:t>
+              <a:t>18/08/2024</a:t>
             </a:fld>
             <a:endParaRPr lang="en-NZ"/>
           </a:p>
@@ -1387,7 +1387,7 @@
           <a:p>
             <a:fld id="{33EE26BC-D039-4438-8DF1-E4431934D20B}" type="datetimeFigureOut">
               <a:rPr lang="en-NZ" smtClean="0"/>
-              <a:t>17/08/2024</a:t>
+              <a:t>18/08/2024</a:t>
             </a:fld>
             <a:endParaRPr lang="en-NZ"/>
           </a:p>
@@ -1719,7 +1719,7 @@
           <a:p>
             <a:fld id="{33EE26BC-D039-4438-8DF1-E4431934D20B}" type="datetimeFigureOut">
               <a:rPr lang="en-NZ" smtClean="0"/>
-              <a:t>17/08/2024</a:t>
+              <a:t>18/08/2024</a:t>
             </a:fld>
             <a:endParaRPr lang="en-NZ"/>
           </a:p>
@@ -2329,7 +2329,7 @@
           <a:p>
             <a:fld id="{33EE26BC-D039-4438-8DF1-E4431934D20B}" type="datetimeFigureOut">
               <a:rPr lang="en-NZ" smtClean="0"/>
-              <a:t>17/08/2024</a:t>
+              <a:t>18/08/2024</a:t>
             </a:fld>
             <a:endParaRPr lang="en-NZ"/>
           </a:p>
@@ -3176,7 +3176,7 @@
           <a:p>
             <a:fld id="{33EE26BC-D039-4438-8DF1-E4431934D20B}" type="datetimeFigureOut">
               <a:rPr lang="en-NZ" smtClean="0"/>
-              <a:t>17/08/2024</a:t>
+              <a:t>18/08/2024</a:t>
             </a:fld>
             <a:endParaRPr lang="en-NZ"/>
           </a:p>
@@ -3346,7 +3346,7 @@
           <a:p>
             <a:fld id="{33EE26BC-D039-4438-8DF1-E4431934D20B}" type="datetimeFigureOut">
               <a:rPr lang="en-NZ" smtClean="0"/>
-              <a:t>17/08/2024</a:t>
+              <a:t>18/08/2024</a:t>
             </a:fld>
             <a:endParaRPr lang="en-NZ"/>
           </a:p>
@@ -3526,7 +3526,7 @@
           <a:p>
             <a:fld id="{33EE26BC-D039-4438-8DF1-E4431934D20B}" type="datetimeFigureOut">
               <a:rPr lang="en-NZ" smtClean="0"/>
-              <a:t>17/08/2024</a:t>
+              <a:t>18/08/2024</a:t>
             </a:fld>
             <a:endParaRPr lang="en-NZ"/>
           </a:p>
@@ -3696,7 +3696,7 @@
           <a:p>
             <a:fld id="{33EE26BC-D039-4438-8DF1-E4431934D20B}" type="datetimeFigureOut">
               <a:rPr lang="en-NZ" smtClean="0"/>
-              <a:t>17/08/2024</a:t>
+              <a:t>18/08/2024</a:t>
             </a:fld>
             <a:endParaRPr lang="en-NZ"/>
           </a:p>
@@ -3940,7 +3940,7 @@
           <a:p>
             <a:fld id="{33EE26BC-D039-4438-8DF1-E4431934D20B}" type="datetimeFigureOut">
               <a:rPr lang="en-NZ" smtClean="0"/>
-              <a:t>17/08/2024</a:t>
+              <a:t>18/08/2024</a:t>
             </a:fld>
             <a:endParaRPr lang="en-NZ"/>
           </a:p>
@@ -4232,7 +4232,7 @@
           <a:p>
             <a:fld id="{33EE26BC-D039-4438-8DF1-E4431934D20B}" type="datetimeFigureOut">
               <a:rPr lang="en-NZ" smtClean="0"/>
-              <a:t>17/08/2024</a:t>
+              <a:t>18/08/2024</a:t>
             </a:fld>
             <a:endParaRPr lang="en-NZ"/>
           </a:p>
@@ -4670,7 +4670,7 @@
           <a:p>
             <a:fld id="{33EE26BC-D039-4438-8DF1-E4431934D20B}" type="datetimeFigureOut">
               <a:rPr lang="en-NZ" smtClean="0"/>
-              <a:t>17/08/2024</a:t>
+              <a:t>18/08/2024</a:t>
             </a:fld>
             <a:endParaRPr lang="en-NZ"/>
           </a:p>
@@ -4788,7 +4788,7 @@
           <a:p>
             <a:fld id="{33EE26BC-D039-4438-8DF1-E4431934D20B}" type="datetimeFigureOut">
               <a:rPr lang="en-NZ" smtClean="0"/>
-              <a:t>17/08/2024</a:t>
+              <a:t>18/08/2024</a:t>
             </a:fld>
             <a:endParaRPr lang="en-NZ"/>
           </a:p>
@@ -4883,7 +4883,7 @@
           <a:p>
             <a:fld id="{33EE26BC-D039-4438-8DF1-E4431934D20B}" type="datetimeFigureOut">
               <a:rPr lang="en-NZ" smtClean="0"/>
-              <a:t>17/08/2024</a:t>
+              <a:t>18/08/2024</a:t>
             </a:fld>
             <a:endParaRPr lang="en-NZ"/>
           </a:p>
@@ -5162,7 +5162,7 @@
           <a:p>
             <a:fld id="{33EE26BC-D039-4438-8DF1-E4431934D20B}" type="datetimeFigureOut">
               <a:rPr lang="en-NZ" smtClean="0"/>
-              <a:t>17/08/2024</a:t>
+              <a:t>18/08/2024</a:t>
             </a:fld>
             <a:endParaRPr lang="en-NZ"/>
           </a:p>
@@ -5437,7 +5437,7 @@
           <a:p>
             <a:fld id="{33EE26BC-D039-4438-8DF1-E4431934D20B}" type="datetimeFigureOut">
               <a:rPr lang="en-NZ" smtClean="0"/>
-              <a:t>17/08/2024</a:t>
+              <a:t>18/08/2024</a:t>
             </a:fld>
             <a:endParaRPr lang="en-NZ"/>
           </a:p>
@@ -5866,7 +5866,7 @@
           <a:p>
             <a:fld id="{33EE26BC-D039-4438-8DF1-E4431934D20B}" type="datetimeFigureOut">
               <a:rPr lang="en-NZ" smtClean="0"/>
-              <a:t>17/08/2024</a:t>
+              <a:t>18/08/2024</a:t>
             </a:fld>
             <a:endParaRPr lang="en-NZ"/>
           </a:p>
@@ -6589,9 +6589,10 @@
           <a:lstStyle/>
           <a:p>
             <a:r>
-              <a:rPr lang="en-NZ" dirty="0"/>
-              <a:t>3</a:t>
-            </a:r>
+              <a:rPr lang="en-NZ"/>
+              <a:t>3 hello</a:t>
+            </a:r>
+            <a:endParaRPr lang="en-NZ" dirty="0"/>
           </a:p>
         </p:txBody>
       </p:sp>

</xml_diff>